<commit_message>
Alpah Version - add more information about Entropy and close the presentation
</commit_message>
<xml_diff>
--- a/Alpah Version/Alpha presentation.pptx
+++ b/Alpah Version/Alpha presentation.pptx
@@ -18,7 +18,8 @@
     <p:sldId id="273" r:id="rId12"/>
     <p:sldId id="276" r:id="rId13"/>
     <p:sldId id="275" r:id="rId14"/>
-    <p:sldId id="265" r:id="rId15"/>
+    <p:sldId id="277" r:id="rId15"/>
+    <p:sldId id="265" r:id="rId16"/>
   </p:sldIdLst>
   <p:sldSz cx="12192000" cy="6858000"/>
   <p:notesSz cx="6858000" cy="9144000"/>
@@ -283,7 +284,7 @@
           <a:p>
             <a:fld id="{CE52457E-648A-4987-AF2E-470A4B8413F7}" type="datetimeFigureOut">
               <a:rPr lang="he-IL" smtClean="0"/>
-              <a:t>ט"ו/שבט/תשע"ח</a:t>
+              <a:t>ט"ז/שבט/תשע"ח</a:t>
             </a:fld>
             <a:endParaRPr lang="he-IL"/>
           </a:p>
@@ -453,7 +454,7 @@
           <a:p>
             <a:fld id="{CE52457E-648A-4987-AF2E-470A4B8413F7}" type="datetimeFigureOut">
               <a:rPr lang="he-IL" smtClean="0"/>
-              <a:t>ט"ו/שבט/תשע"ח</a:t>
+              <a:t>ט"ז/שבט/תשע"ח</a:t>
             </a:fld>
             <a:endParaRPr lang="he-IL"/>
           </a:p>
@@ -633,7 +634,7 @@
           <a:p>
             <a:fld id="{CE52457E-648A-4987-AF2E-470A4B8413F7}" type="datetimeFigureOut">
               <a:rPr lang="he-IL" smtClean="0"/>
-              <a:t>ט"ו/שבט/תשע"ח</a:t>
+              <a:t>ט"ז/שבט/תשע"ח</a:t>
             </a:fld>
             <a:endParaRPr lang="he-IL"/>
           </a:p>
@@ -892,7 +893,7 @@
           <a:p>
             <a:fld id="{CE52457E-648A-4987-AF2E-470A4B8413F7}" type="datetimeFigureOut">
               <a:rPr lang="he-IL" smtClean="0"/>
-              <a:t>ט"ו/שבט/תשע"ח</a:t>
+              <a:t>ט"ז/שבט/תשע"ח</a:t>
             </a:fld>
             <a:endParaRPr lang="he-IL"/>
           </a:p>
@@ -1095,7 +1096,7 @@
           <a:p>
             <a:fld id="{CE52457E-648A-4987-AF2E-470A4B8413F7}" type="datetimeFigureOut">
               <a:rPr lang="he-IL" smtClean="0"/>
-              <a:t>ט"ו/שבט/תשע"ח</a:t>
+              <a:t>ט"ז/שבט/תשע"ח</a:t>
             </a:fld>
             <a:endParaRPr lang="he-IL"/>
           </a:p>
@@ -1265,7 +1266,7 @@
           <a:p>
             <a:fld id="{CE52457E-648A-4987-AF2E-470A4B8413F7}" type="datetimeFigureOut">
               <a:rPr lang="he-IL" smtClean="0"/>
-              <a:t>ט"ו/שבט/תשע"ח</a:t>
+              <a:t>ט"ז/שבט/תשע"ח</a:t>
             </a:fld>
             <a:endParaRPr lang="he-IL"/>
           </a:p>
@@ -1516,7 +1517,7 @@
           <a:p>
             <a:fld id="{CE52457E-648A-4987-AF2E-470A4B8413F7}" type="datetimeFigureOut">
               <a:rPr lang="he-IL" smtClean="0"/>
-              <a:t>ט"ו/שבט/תשע"ח</a:t>
+              <a:t>ט"ז/שבט/תשע"ח</a:t>
             </a:fld>
             <a:endParaRPr lang="he-IL"/>
           </a:p>
@@ -1748,7 +1749,7 @@
           <a:p>
             <a:fld id="{CE52457E-648A-4987-AF2E-470A4B8413F7}" type="datetimeFigureOut">
               <a:rPr lang="he-IL" smtClean="0"/>
-              <a:t>ט"ו/שבט/תשע"ח</a:t>
+              <a:t>ט"ז/שבט/תשע"ח</a:t>
             </a:fld>
             <a:endParaRPr lang="he-IL"/>
           </a:p>
@@ -2095,7 +2096,7 @@
           <a:p>
             <a:fld id="{CE52457E-648A-4987-AF2E-470A4B8413F7}" type="datetimeFigureOut">
               <a:rPr lang="he-IL" smtClean="0"/>
-              <a:t>ט"ו/שבט/תשע"ח</a:t>
+              <a:t>ט"ז/שבט/תשע"ח</a:t>
             </a:fld>
             <a:endParaRPr lang="he-IL"/>
           </a:p>
@@ -2213,7 +2214,7 @@
           <a:p>
             <a:fld id="{CE52457E-648A-4987-AF2E-470A4B8413F7}" type="datetimeFigureOut">
               <a:rPr lang="he-IL" smtClean="0"/>
-              <a:t>ט"ו/שבט/תשע"ח</a:t>
+              <a:t>ט"ז/שבט/תשע"ח</a:t>
             </a:fld>
             <a:endParaRPr lang="he-IL"/>
           </a:p>
@@ -2331,7 +2332,7 @@
           <a:p>
             <a:fld id="{CE52457E-648A-4987-AF2E-470A4B8413F7}" type="datetimeFigureOut">
               <a:rPr lang="he-IL" smtClean="0"/>
-              <a:t>ט"ו/שבט/תשע"ח</a:t>
+              <a:t>ט"ז/שבט/תשע"ח</a:t>
             </a:fld>
             <a:endParaRPr lang="he-IL"/>
           </a:p>
@@ -2501,7 +2502,7 @@
           <a:p>
             <a:fld id="{CE52457E-648A-4987-AF2E-470A4B8413F7}" type="datetimeFigureOut">
               <a:rPr lang="he-IL" smtClean="0"/>
-              <a:t>ט"ו/שבט/תשע"ח</a:t>
+              <a:t>ט"ז/שבט/תשע"ח</a:t>
             </a:fld>
             <a:endParaRPr lang="he-IL"/>
           </a:p>
@@ -2785,7 +2786,7 @@
           <a:p>
             <a:fld id="{CE52457E-648A-4987-AF2E-470A4B8413F7}" type="datetimeFigureOut">
               <a:rPr lang="he-IL" smtClean="0"/>
-              <a:t>ט"ו/שבט/תשע"ח</a:t>
+              <a:t>ט"ז/שבט/תשע"ח</a:t>
             </a:fld>
             <a:endParaRPr lang="he-IL"/>
           </a:p>
@@ -3049,7 +3050,7 @@
           <a:p>
             <a:fld id="{CE52457E-648A-4987-AF2E-470A4B8413F7}" type="datetimeFigureOut">
               <a:rPr lang="he-IL" smtClean="0"/>
-              <a:t>ט"ו/שבט/תשע"ח</a:t>
+              <a:t>ט"ז/שבט/תשע"ח</a:t>
             </a:fld>
             <a:endParaRPr lang="he-IL"/>
           </a:p>
@@ -3219,7 +3220,7 @@
           <a:p>
             <a:fld id="{CE52457E-648A-4987-AF2E-470A4B8413F7}" type="datetimeFigureOut">
               <a:rPr lang="he-IL" smtClean="0"/>
-              <a:t>ט"ו/שבט/תשע"ח</a:t>
+              <a:t>ט"ז/שבט/תשע"ח</a:t>
             </a:fld>
             <a:endParaRPr lang="he-IL"/>
           </a:p>
@@ -3399,7 +3400,7 @@
           <a:p>
             <a:fld id="{CE52457E-648A-4987-AF2E-470A4B8413F7}" type="datetimeFigureOut">
               <a:rPr lang="he-IL" smtClean="0"/>
-              <a:t>ט"ו/שבט/תשע"ח</a:t>
+              <a:t>ט"ז/שבט/תשע"ח</a:t>
             </a:fld>
             <a:endParaRPr lang="he-IL"/>
           </a:p>
@@ -3647,7 +3648,7 @@
           <a:p>
             <a:fld id="{CE52457E-648A-4987-AF2E-470A4B8413F7}" type="datetimeFigureOut">
               <a:rPr lang="he-IL" smtClean="0"/>
-              <a:t>ט"ו/שבט/תשע"ח</a:t>
+              <a:t>ט"ז/שבט/תשע"ח</a:t>
             </a:fld>
             <a:endParaRPr lang="he-IL"/>
           </a:p>
@@ -3850,7 +3851,7 @@
           <a:p>
             <a:fld id="{CE52457E-648A-4987-AF2E-470A4B8413F7}" type="datetimeFigureOut">
               <a:rPr lang="he-IL" smtClean="0"/>
-              <a:t>ט"ו/שבט/תשע"ח</a:t>
+              <a:t>ט"ז/שבט/תשע"ח</a:t>
             </a:fld>
             <a:endParaRPr lang="he-IL"/>
           </a:p>
@@ -4020,7 +4021,7 @@
           <a:p>
             <a:fld id="{CE52457E-648A-4987-AF2E-470A4B8413F7}" type="datetimeFigureOut">
               <a:rPr lang="he-IL" smtClean="0"/>
-              <a:t>ט"ו/שבט/תשע"ח</a:t>
+              <a:t>ט"ז/שבט/תשע"ח</a:t>
             </a:fld>
             <a:endParaRPr lang="he-IL"/>
           </a:p>
@@ -4271,7 +4272,7 @@
           <a:p>
             <a:fld id="{CE52457E-648A-4987-AF2E-470A4B8413F7}" type="datetimeFigureOut">
               <a:rPr lang="he-IL" smtClean="0"/>
-              <a:t>ט"ו/שבט/תשע"ח</a:t>
+              <a:t>ט"ז/שבט/תשע"ח</a:t>
             </a:fld>
             <a:endParaRPr lang="he-IL"/>
           </a:p>
@@ -4503,7 +4504,7 @@
           <a:p>
             <a:fld id="{CE52457E-648A-4987-AF2E-470A4B8413F7}" type="datetimeFigureOut">
               <a:rPr lang="he-IL" smtClean="0"/>
-              <a:t>ט"ו/שבט/תשע"ח</a:t>
+              <a:t>ט"ז/שבט/תשע"ח</a:t>
             </a:fld>
             <a:endParaRPr lang="he-IL"/>
           </a:p>
@@ -4850,7 +4851,7 @@
           <a:p>
             <a:fld id="{CE52457E-648A-4987-AF2E-470A4B8413F7}" type="datetimeFigureOut">
               <a:rPr lang="he-IL" smtClean="0"/>
-              <a:t>ט"ו/שבט/תשע"ח</a:t>
+              <a:t>ט"ז/שבט/תשע"ח</a:t>
             </a:fld>
             <a:endParaRPr lang="he-IL"/>
           </a:p>
@@ -5124,7 +5125,7 @@
           <a:p>
             <a:fld id="{CE52457E-648A-4987-AF2E-470A4B8413F7}" type="datetimeFigureOut">
               <a:rPr lang="he-IL" smtClean="0"/>
-              <a:t>ט"ו/שבט/תשע"ח</a:t>
+              <a:t>ט"ז/שבט/תשע"ח</a:t>
             </a:fld>
             <a:endParaRPr lang="he-IL"/>
           </a:p>
@@ -5219,7 +5220,7 @@
           <a:p>
             <a:fld id="{CE52457E-648A-4987-AF2E-470A4B8413F7}" type="datetimeFigureOut">
               <a:rPr lang="he-IL" smtClean="0"/>
-              <a:t>ט"ו/שבט/תשע"ח</a:t>
+              <a:t>ט"ז/שבט/תשע"ח</a:t>
             </a:fld>
             <a:endParaRPr lang="he-IL"/>
           </a:p>
@@ -5337,7 +5338,7 @@
           <a:p>
             <a:fld id="{CE52457E-648A-4987-AF2E-470A4B8413F7}" type="datetimeFigureOut">
               <a:rPr lang="he-IL" smtClean="0"/>
-              <a:t>ט"ו/שבט/תשע"ח</a:t>
+              <a:t>ט"ז/שבט/תשע"ח</a:t>
             </a:fld>
             <a:endParaRPr lang="he-IL"/>
           </a:p>
@@ -5621,7 +5622,7 @@
           <a:p>
             <a:fld id="{CE52457E-648A-4987-AF2E-470A4B8413F7}" type="datetimeFigureOut">
               <a:rPr lang="he-IL" smtClean="0"/>
-              <a:t>ט"ו/שבט/תשע"ח</a:t>
+              <a:t>ט"ז/שבט/תשע"ח</a:t>
             </a:fld>
             <a:endParaRPr lang="he-IL"/>
           </a:p>
@@ -5885,7 +5886,7 @@
           <a:p>
             <a:fld id="{CE52457E-648A-4987-AF2E-470A4B8413F7}" type="datetimeFigureOut">
               <a:rPr lang="he-IL" smtClean="0"/>
-              <a:t>ט"ו/שבט/תשע"ח</a:t>
+              <a:t>ט"ז/שבט/תשע"ח</a:t>
             </a:fld>
             <a:endParaRPr lang="he-IL"/>
           </a:p>
@@ -6055,7 +6056,7 @@
           <a:p>
             <a:fld id="{CE52457E-648A-4987-AF2E-470A4B8413F7}" type="datetimeFigureOut">
               <a:rPr lang="he-IL" smtClean="0"/>
-              <a:t>ט"ו/שבט/תשע"ח</a:t>
+              <a:t>ט"ז/שבט/תשע"ח</a:t>
             </a:fld>
             <a:endParaRPr lang="he-IL"/>
           </a:p>
@@ -6235,7 +6236,7 @@
           <a:p>
             <a:fld id="{CE52457E-648A-4987-AF2E-470A4B8413F7}" type="datetimeFigureOut">
               <a:rPr lang="he-IL" smtClean="0"/>
-              <a:t>ט"ו/שבט/תשע"ח</a:t>
+              <a:t>ט"ז/שבט/תשע"ח</a:t>
             </a:fld>
             <a:endParaRPr lang="he-IL"/>
           </a:p>
@@ -6485,7 +6486,7 @@
           <a:p>
             <a:fld id="{CE52457E-648A-4987-AF2E-470A4B8413F7}" type="datetimeFigureOut">
               <a:rPr lang="he-IL" smtClean="0"/>
-              <a:t>ט"ו/שבט/תשע"ח</a:t>
+              <a:t>ט"ז/שבט/תשע"ח</a:t>
             </a:fld>
             <a:endParaRPr lang="he-IL"/>
           </a:p>
@@ -7268,7 +7269,7 @@
           <a:p>
             <a:fld id="{CE52457E-648A-4987-AF2E-470A4B8413F7}" type="datetimeFigureOut">
               <a:rPr lang="he-IL" smtClean="0"/>
-              <a:t>ט"ו/שבט/תשע"ח</a:t>
+              <a:t>ט"ז/שבט/תשע"ח</a:t>
             </a:fld>
             <a:endParaRPr lang="he-IL"/>
           </a:p>
@@ -7444,7 +7445,7 @@
           <a:p>
             <a:fld id="{CE52457E-648A-4987-AF2E-470A4B8413F7}" type="datetimeFigureOut">
               <a:rPr lang="he-IL" smtClean="0"/>
-              <a:t>ט"ו/שבט/תשע"ח</a:t>
+              <a:t>ט"ז/שבט/תשע"ח</a:t>
             </a:fld>
             <a:endParaRPr lang="he-IL"/>
           </a:p>
@@ -7691,7 +7692,7 @@
           <a:p>
             <a:fld id="{CE52457E-648A-4987-AF2E-470A4B8413F7}" type="datetimeFigureOut">
               <a:rPr lang="he-IL" smtClean="0"/>
-              <a:t>ט"ו/שבט/תשע"ח</a:t>
+              <a:t>ט"ז/שבט/תשע"ח</a:t>
             </a:fld>
             <a:endParaRPr lang="he-IL"/>
           </a:p>
@@ -7923,7 +7924,7 @@
           <a:p>
             <a:fld id="{CE52457E-648A-4987-AF2E-470A4B8413F7}" type="datetimeFigureOut">
               <a:rPr lang="he-IL" smtClean="0"/>
-              <a:t>ט"ו/שבט/תשע"ח</a:t>
+              <a:t>ט"ז/שבט/תשע"ח</a:t>
             </a:fld>
             <a:endParaRPr lang="he-IL"/>
           </a:p>
@@ -8155,7 +8156,7 @@
           <a:p>
             <a:fld id="{CE52457E-648A-4987-AF2E-470A4B8413F7}" type="datetimeFigureOut">
               <a:rPr lang="he-IL" smtClean="0"/>
-              <a:t>ט"ו/שבט/תשע"ח</a:t>
+              <a:t>ט"ז/שבט/תשע"ח</a:t>
             </a:fld>
             <a:endParaRPr lang="he-IL"/>
           </a:p>
@@ -8529,7 +8530,7 @@
           <a:p>
             <a:fld id="{CE52457E-648A-4987-AF2E-470A4B8413F7}" type="datetimeFigureOut">
               <a:rPr lang="he-IL" smtClean="0"/>
-              <a:t>ט"ו/שבט/תשע"ח</a:t>
+              <a:t>ט"ז/שבט/תשע"ח</a:t>
             </a:fld>
             <a:endParaRPr lang="he-IL"/>
           </a:p>
@@ -8652,7 +8653,7 @@
           <a:p>
             <a:fld id="{CE52457E-648A-4987-AF2E-470A4B8413F7}" type="datetimeFigureOut">
               <a:rPr lang="he-IL" smtClean="0"/>
-              <a:t>ט"ו/שבט/תשע"ח</a:t>
+              <a:t>ט"ז/שבט/תשע"ח</a:t>
             </a:fld>
             <a:endParaRPr lang="he-IL"/>
           </a:p>
@@ -8747,7 +8748,7 @@
           <a:p>
             <a:fld id="{CE52457E-648A-4987-AF2E-470A4B8413F7}" type="datetimeFigureOut">
               <a:rPr lang="he-IL" smtClean="0"/>
-              <a:t>ט"ו/שבט/תשע"ח</a:t>
+              <a:t>ט"ז/שבט/תשע"ח</a:t>
             </a:fld>
             <a:endParaRPr lang="he-IL"/>
           </a:p>
@@ -9002,7 +9003,7 @@
           <a:p>
             <a:fld id="{CE52457E-648A-4987-AF2E-470A4B8413F7}" type="datetimeFigureOut">
               <a:rPr lang="he-IL" smtClean="0"/>
-              <a:t>ט"ו/שבט/תשע"ח</a:t>
+              <a:t>ט"ז/שבט/תשע"ח</a:t>
             </a:fld>
             <a:endParaRPr lang="he-IL"/>
           </a:p>
@@ -9265,7 +9266,7 @@
           <a:p>
             <a:fld id="{CE52457E-648A-4987-AF2E-470A4B8413F7}" type="datetimeFigureOut">
               <a:rPr lang="he-IL" smtClean="0"/>
-              <a:t>ט"ו/שבט/תשע"ח</a:t>
+              <a:t>ט"ז/שבט/תשע"ח</a:t>
             </a:fld>
             <a:endParaRPr lang="he-IL"/>
           </a:p>
@@ -9516,7 +9517,7 @@
           <a:p>
             <a:fld id="{CE52457E-648A-4987-AF2E-470A4B8413F7}" type="datetimeFigureOut">
               <a:rPr lang="he-IL" smtClean="0"/>
-              <a:t>ט"ו/שבט/תשע"ח</a:t>
+              <a:t>ט"ז/שבט/תשע"ח</a:t>
             </a:fld>
             <a:endParaRPr lang="he-IL"/>
           </a:p>
@@ -9830,7 +9831,7 @@
           <a:p>
             <a:fld id="{CE52457E-648A-4987-AF2E-470A4B8413F7}" type="datetimeFigureOut">
               <a:rPr lang="he-IL" smtClean="0"/>
-              <a:t>ט"ו/שבט/תשע"ח</a:t>
+              <a:t>ט"ז/שבט/תשע"ח</a:t>
             </a:fld>
             <a:endParaRPr lang="he-IL"/>
           </a:p>
@@ -10171,7 +10172,7 @@
           <a:p>
             <a:fld id="{CE52457E-648A-4987-AF2E-470A4B8413F7}" type="datetimeFigureOut">
               <a:rPr lang="he-IL" smtClean="0"/>
-              <a:t>ט"ו/שבט/תשע"ח</a:t>
+              <a:t>ט"ז/שבט/תשע"ח</a:t>
             </a:fld>
             <a:endParaRPr lang="he-IL"/>
           </a:p>
@@ -10485,7 +10486,7 @@
           <a:p>
             <a:fld id="{CE52457E-648A-4987-AF2E-470A4B8413F7}" type="datetimeFigureOut">
               <a:rPr lang="he-IL" smtClean="0"/>
-              <a:t>ט"ו/שבט/תשע"ח</a:t>
+              <a:t>ט"ז/שבט/תשע"ח</a:t>
             </a:fld>
             <a:endParaRPr lang="he-IL"/>
           </a:p>
@@ -10914,7 +10915,7 @@
           <a:p>
             <a:fld id="{CE52457E-648A-4987-AF2E-470A4B8413F7}" type="datetimeFigureOut">
               <a:rPr lang="he-IL" smtClean="0"/>
-              <a:t>ט"ו/שבט/תשע"ח</a:t>
+              <a:t>ט"ז/שבט/תשע"ח</a:t>
             </a:fld>
             <a:endParaRPr lang="he-IL"/>
           </a:p>
@@ -11248,7 +11249,7 @@
           <a:p>
             <a:fld id="{CE52457E-648A-4987-AF2E-470A4B8413F7}" type="datetimeFigureOut">
               <a:rPr lang="he-IL" smtClean="0"/>
-              <a:t>ט"ו/שבט/תשע"ח</a:t>
+              <a:t>ט"ז/שבט/תשע"ח</a:t>
             </a:fld>
             <a:endParaRPr lang="he-IL"/>
           </a:p>
@@ -11418,7 +11419,7 @@
           <a:p>
             <a:fld id="{CE52457E-648A-4987-AF2E-470A4B8413F7}" type="datetimeFigureOut">
               <a:rPr lang="he-IL" smtClean="0"/>
-              <a:t>ט"ו/שבט/תשע"ח</a:t>
+              <a:t>ט"ז/שבט/תשע"ח</a:t>
             </a:fld>
             <a:endParaRPr lang="he-IL"/>
           </a:p>
@@ -11598,7 +11599,7 @@
           <a:p>
             <a:fld id="{CE52457E-648A-4987-AF2E-470A4B8413F7}" type="datetimeFigureOut">
               <a:rPr lang="he-IL" smtClean="0"/>
-              <a:t>ט"ו/שבט/תשע"ח</a:t>
+              <a:t>ט"ז/שבט/תשע"ח</a:t>
             </a:fld>
             <a:endParaRPr lang="he-IL"/>
           </a:p>
@@ -11693,7 +11694,7 @@
           <a:p>
             <a:fld id="{CE52457E-648A-4987-AF2E-470A4B8413F7}" type="datetimeFigureOut">
               <a:rPr lang="he-IL" smtClean="0"/>
-              <a:t>ט"ו/שבט/תשע"ח</a:t>
+              <a:t>ט"ז/שבט/תשע"ח</a:t>
             </a:fld>
             <a:endParaRPr lang="he-IL"/>
           </a:p>
@@ -11811,7 +11812,7 @@
           <a:p>
             <a:fld id="{CE52457E-648A-4987-AF2E-470A4B8413F7}" type="datetimeFigureOut">
               <a:rPr lang="he-IL" smtClean="0"/>
-              <a:t>ט"ו/שבט/תשע"ח</a:t>
+              <a:t>ט"ז/שבט/תשע"ח</a:t>
             </a:fld>
             <a:endParaRPr lang="he-IL"/>
           </a:p>
@@ -12095,7 +12096,7 @@
           <a:p>
             <a:fld id="{CE52457E-648A-4987-AF2E-470A4B8413F7}" type="datetimeFigureOut">
               <a:rPr lang="he-IL" smtClean="0"/>
-              <a:t>ט"ו/שבט/תשע"ח</a:t>
+              <a:t>ט"ז/שבט/תשע"ח</a:t>
             </a:fld>
             <a:endParaRPr lang="he-IL"/>
           </a:p>
@@ -12359,7 +12360,7 @@
           <a:p>
             <a:fld id="{CE52457E-648A-4987-AF2E-470A4B8413F7}" type="datetimeFigureOut">
               <a:rPr lang="he-IL" smtClean="0"/>
-              <a:t>ט"ו/שבט/תשע"ח</a:t>
+              <a:t>ט"ז/שבט/תשע"ח</a:t>
             </a:fld>
             <a:endParaRPr lang="he-IL"/>
           </a:p>
@@ -12573,7 +12574,7 @@
           <a:p>
             <a:fld id="{CE52457E-648A-4987-AF2E-470A4B8413F7}" type="datetimeFigureOut">
               <a:rPr lang="he-IL" smtClean="0"/>
-              <a:t>ט"ו/שבט/תשע"ח</a:t>
+              <a:t>ט"ז/שבט/תשע"ח</a:t>
             </a:fld>
             <a:endParaRPr lang="he-IL"/>
           </a:p>
@@ -13104,7 +13105,7 @@
           <a:p>
             <a:fld id="{CE52457E-648A-4987-AF2E-470A4B8413F7}" type="datetimeFigureOut">
               <a:rPr lang="he-IL" smtClean="0"/>
-              <a:t>ט"ו/שבט/תשע"ח</a:t>
+              <a:t>ט"ז/שבט/תשע"ח</a:t>
             </a:fld>
             <a:endParaRPr lang="he-IL"/>
           </a:p>
@@ -13635,7 +13636,7 @@
           <a:p>
             <a:fld id="{CE52457E-648A-4987-AF2E-470A4B8413F7}" type="datetimeFigureOut">
               <a:rPr lang="he-IL" smtClean="0"/>
-              <a:t>ט"ו/שבט/תשע"ח</a:t>
+              <a:t>ט"ז/שבט/תשע"ח</a:t>
             </a:fld>
             <a:endParaRPr lang="he-IL"/>
           </a:p>
@@ -14695,7 +14696,7 @@
           <a:p>
             <a:fld id="{CE52457E-648A-4987-AF2E-470A4B8413F7}" type="datetimeFigureOut">
               <a:rPr lang="he-IL" smtClean="0"/>
-              <a:t>ט"ו/שבט/תשע"ח</a:t>
+              <a:t>ט"ז/שבט/תשע"ח</a:t>
             </a:fld>
             <a:endParaRPr lang="he-IL"/>
           </a:p>
@@ -15585,6 +15586,291 @@
           <p:cNvPr id="3" name="מציין מיקום טקסט 2">
             <a:extLst>
               <a:ext uri="{FF2B5EF4-FFF2-40B4-BE49-F238E27FC236}">
+                <a16:creationId xmlns:a16="http://schemas.microsoft.com/office/drawing/2014/main" id="{1C201CF5-111E-4331-B1C9-BF7FFB225509}"/>
+              </a:ext>
+            </a:extLst>
+          </p:cNvPr>
+          <p:cNvSpPr>
+            <a:spLocks noGrp="1"/>
+          </p:cNvSpPr>
+          <p:nvPr>
+            <p:ph type="body" idx="1"/>
+          </p:nvPr>
+        </p:nvSpPr>
+        <p:spPr>
+          <a:xfrm>
+            <a:off x="677335" y="2580899"/>
+            <a:ext cx="8915399" cy="2718367"/>
+          </a:xfrm>
+        </p:spPr>
+        <p:txBody>
+          <a:bodyPr>
+            <a:noAutofit/>
+          </a:bodyPr>
+          <a:lstStyle/>
+          <a:p>
+            <a:pPr marL="342900" indent="-342900" algn="just">
+              <a:buFont typeface="Wingdings" panose="05000000000000000000" pitchFamily="2" charset="2"/>
+              <a:buChar char="Ø"/>
+            </a:pPr>
+            <a:endParaRPr lang="he-IL" dirty="0"/>
+          </a:p>
+          <a:p>
+            <a:pPr marL="342900" indent="-342900" algn="just">
+              <a:buFont typeface="Wingdings" panose="05000000000000000000" pitchFamily="2" charset="2"/>
+              <a:buChar char="Ø"/>
+            </a:pPr>
+            <a:endParaRPr lang="he-IL" dirty="0"/>
+          </a:p>
+          <a:p>
+            <a:pPr marL="342900" indent="-342900" algn="just">
+              <a:buFont typeface="Wingdings" panose="05000000000000000000" pitchFamily="2" charset="2"/>
+              <a:buChar char="Ø"/>
+            </a:pPr>
+            <a:endParaRPr lang="he-IL" dirty="0"/>
+          </a:p>
+          <a:p>
+            <a:pPr marL="342900" indent="-342900" algn="just">
+              <a:buFont typeface="Wingdings" panose="05000000000000000000" pitchFamily="2" charset="2"/>
+              <a:buChar char="Ø"/>
+            </a:pPr>
+            <a:endParaRPr lang="he-IL" dirty="0"/>
+          </a:p>
+          <a:p>
+            <a:pPr marL="342900" indent="-342900" algn="just">
+              <a:buFont typeface="Wingdings" panose="05000000000000000000" pitchFamily="2" charset="2"/>
+              <a:buChar char="Ø"/>
+            </a:pPr>
+            <a:r>
+              <a:rPr lang="he-IL" dirty="0"/>
+              <a:t>"האנטרופיה של </a:t>
+            </a:r>
+            <a:r>
+              <a:rPr lang="he-IL" dirty="0" err="1"/>
+              <a:t>שאנון</a:t>
+            </a:r>
+            <a:r>
+              <a:rPr lang="he-IL" dirty="0"/>
+              <a:t>" - מדד לאי וודאות על קבוצת מצבים אפשריים </a:t>
+            </a:r>
+            <a:r>
+              <a:rPr lang="en-US" dirty="0"/>
+              <a:t>X</a:t>
+            </a:r>
+            <a:r>
+              <a:rPr lang="he-IL" dirty="0"/>
+              <a:t> בהסתברויות </a:t>
+            </a:r>
+            <a:r>
+              <a:rPr lang="en-US" dirty="0"/>
+              <a:t>p(X1),…..p(</a:t>
+            </a:r>
+            <a:r>
+              <a:rPr lang="en-US" dirty="0" err="1"/>
+              <a:t>Xn</a:t>
+            </a:r>
+            <a:r>
+              <a:rPr lang="en-US" dirty="0"/>
+              <a:t>)</a:t>
+            </a:r>
+            <a:r>
+              <a:rPr lang="he-IL" dirty="0"/>
+              <a:t>.</a:t>
+            </a:r>
+          </a:p>
+          <a:p>
+            <a:pPr marL="342900" indent="-342900" algn="just">
+              <a:buFont typeface="Wingdings" panose="05000000000000000000" pitchFamily="2" charset="2"/>
+              <a:buChar char="Ø"/>
+            </a:pPr>
+            <a:r>
+              <a:rPr lang="he-IL" dirty="0"/>
+              <a:t>ככל שהמשתנה יותר רנדומלי כך האנטרופיה יותר גדולה ואותו דבר הפוך - ככל שיש לנו יותר מודעות באשר למשתנים כך האנטרופיה יותר קטנה. </a:t>
+            </a:r>
+          </a:p>
+          <a:p>
+            <a:pPr marL="342900" indent="-342900" algn="just">
+              <a:buFont typeface="Wingdings" panose="05000000000000000000" pitchFamily="2" charset="2"/>
+              <a:buChar char="Ø"/>
+            </a:pPr>
+            <a:r>
+              <a:rPr lang="he-IL" dirty="0"/>
+              <a:t>בניסיון להתאים את הרעיון לעקרונות האנומליה במערכת מורכבת וסגורה –  כאשר יש הערכה לגבי דפוסי משתנים תקינים, בעת זיהוי אנטרופיה גבוהה, נטען כי זיהינו דפוס חריג - ומכאן נזהה אנומליה.</a:t>
+            </a:r>
+          </a:p>
+          <a:p>
+            <a:pPr marL="342900" indent="-342900" algn="just">
+              <a:buFont typeface="Wingdings" panose="05000000000000000000" pitchFamily="2" charset="2"/>
+              <a:buChar char="Ø"/>
+            </a:pPr>
+            <a:endParaRPr lang="he-IL" dirty="0"/>
+          </a:p>
+          <a:p>
+            <a:pPr algn="just"/>
+            <a:endParaRPr lang="en-US" sz="2000" dirty="0">
+              <a:latin typeface="Calibri" panose="020F0502020204030204" pitchFamily="34" charset="0"/>
+              <a:cs typeface="Calibri" panose="020F0502020204030204" pitchFamily="34" charset="0"/>
+            </a:endParaRPr>
+          </a:p>
+          <a:p>
+            <a:pPr algn="just"/>
+            <a:endParaRPr lang="he-IL" sz="2000" dirty="0">
+              <a:latin typeface="Calibri" panose="020F0502020204030204" pitchFamily="34" charset="0"/>
+              <a:cs typeface="Calibri" panose="020F0502020204030204" pitchFamily="34" charset="0"/>
+            </a:endParaRPr>
+          </a:p>
+          <a:p>
+            <a:pPr algn="just"/>
+            <a:endParaRPr lang="he-IL" sz="2000" dirty="0">
+              <a:latin typeface="Calibri" panose="020F0502020204030204" pitchFamily="34" charset="0"/>
+              <a:cs typeface="Calibri" panose="020F0502020204030204" pitchFamily="34" charset="0"/>
+            </a:endParaRPr>
+          </a:p>
+        </p:txBody>
+      </p:sp>
+      <p:sp>
+        <p:nvSpPr>
+          <p:cNvPr id="6" name="כותרת 1">
+            <a:extLst>
+              <a:ext uri="{FF2B5EF4-FFF2-40B4-BE49-F238E27FC236}">
+                <a16:creationId xmlns:a16="http://schemas.microsoft.com/office/drawing/2014/main" id="{D697E18A-956C-4341-A502-54C9BD113BAD}"/>
+              </a:ext>
+            </a:extLst>
+          </p:cNvPr>
+          <p:cNvSpPr>
+            <a:spLocks noGrp="1"/>
+          </p:cNvSpPr>
+          <p:nvPr>
+            <p:ph type="title"/>
+          </p:nvPr>
+        </p:nvSpPr>
+        <p:spPr>
+          <a:xfrm>
+            <a:off x="677335" y="609600"/>
+            <a:ext cx="8643646" cy="1858297"/>
+          </a:xfrm>
+        </p:spPr>
+        <p:txBody>
+          <a:bodyPr/>
+          <a:lstStyle/>
+          <a:p>
+            <a:pPr algn="r"/>
+            <a:r>
+              <a:rPr lang="he-IL" dirty="0">
+                <a:latin typeface="Calibri" panose="020F0502020204030204" pitchFamily="34" charset="0"/>
+                <a:cs typeface="Calibri" panose="020F0502020204030204" pitchFamily="34" charset="0"/>
+              </a:rPr>
+              <a:t>אנטרופיה - </a:t>
+            </a:r>
+            <a:r>
+              <a:rPr lang="en-US" dirty="0">
+                <a:latin typeface="Calibri" panose="020F0502020204030204" pitchFamily="34" charset="0"/>
+                <a:cs typeface="Calibri" panose="020F0502020204030204" pitchFamily="34" charset="0"/>
+              </a:rPr>
+              <a:t>Entropy</a:t>
+            </a:r>
+            <a:endParaRPr lang="he-IL" dirty="0">
+              <a:latin typeface="Calibri" panose="020F0502020204030204" pitchFamily="34" charset="0"/>
+              <a:cs typeface="Calibri" panose="020F0502020204030204" pitchFamily="34" charset="0"/>
+            </a:endParaRPr>
+          </a:p>
+        </p:txBody>
+      </p:sp>
+      <p:pic>
+        <p:nvPicPr>
+          <p:cNvPr id="2" name="תמונה 1">
+            <a:extLst>
+              <a:ext uri="{FF2B5EF4-FFF2-40B4-BE49-F238E27FC236}">
+                <a16:creationId xmlns:a16="http://schemas.microsoft.com/office/drawing/2014/main" id="{38DD8C32-FC26-4C2B-93DF-A3923706A48B}"/>
+              </a:ext>
+            </a:extLst>
+          </p:cNvPr>
+          <p:cNvPicPr>
+            <a:picLocks noChangeAspect="1"/>
+          </p:cNvPicPr>
+          <p:nvPr/>
+        </p:nvPicPr>
+        <p:blipFill>
+          <a:blip r:embed="rId2"/>
+          <a:stretch>
+            <a:fillRect/>
+          </a:stretch>
+        </p:blipFill>
+        <p:spPr>
+          <a:xfrm>
+            <a:off x="677335" y="877274"/>
+            <a:ext cx="3523793" cy="1322947"/>
+          </a:xfrm>
+          <a:prstGeom prst="rect">
+            <a:avLst/>
+          </a:prstGeom>
+          <a:solidFill>
+            <a:srgbClr val="FFFFFF">
+              <a:shade val="85000"/>
+            </a:srgbClr>
+          </a:solidFill>
+          <a:ln w="88900" cap="sq">
+            <a:solidFill>
+              <a:srgbClr val="FFFFFF"/>
+            </a:solidFill>
+            <a:miter lim="800000"/>
+          </a:ln>
+          <a:effectLst>
+            <a:outerShdw blurRad="55000" dist="18000" dir="5400000" algn="tl" rotWithShape="0">
+              <a:srgbClr val="000000">
+                <a:alpha val="40000"/>
+              </a:srgbClr>
+            </a:outerShdw>
+          </a:effectLst>
+          <a:scene3d>
+            <a:camera prst="orthographicFront"/>
+            <a:lightRig rig="twoPt" dir="t">
+              <a:rot lat="0" lon="0" rev="7200000"/>
+            </a:lightRig>
+          </a:scene3d>
+          <a:sp3d>
+            <a:bevelT w="25400" h="19050"/>
+            <a:contourClr>
+              <a:srgbClr val="FFFFFF"/>
+            </a:contourClr>
+          </a:sp3d>
+        </p:spPr>
+      </p:pic>
+    </p:spTree>
+    <p:extLst>
+      <p:ext uri="{BB962C8B-B14F-4D97-AF65-F5344CB8AC3E}">
+        <p14:creationId xmlns:p14="http://schemas.microsoft.com/office/powerpoint/2010/main" val="3434550053"/>
+      </p:ext>
+    </p:extLst>
+  </p:cSld>
+  <p:clrMapOvr>
+    <a:masterClrMapping/>
+  </p:clrMapOvr>
+</p:sld>
+</file>
+
+<file path=ppt/slides/slide12.xml><?xml version="1.0" encoding="utf-8"?>
+<p:sld xmlns:a="http://schemas.openxmlformats.org/drawingml/2006/main" xmlns:r="http://schemas.openxmlformats.org/officeDocument/2006/relationships" xmlns:p="http://schemas.openxmlformats.org/presentationml/2006/main">
+  <p:cSld>
+    <p:spTree>
+      <p:nvGrpSpPr>
+        <p:cNvPr id="1" name=""/>
+        <p:cNvGrpSpPr/>
+        <p:nvPr/>
+      </p:nvGrpSpPr>
+      <p:grpSpPr>
+        <a:xfrm>
+          <a:off x="0" y="0"/>
+          <a:ext cx="0" cy="0"/>
+          <a:chOff x="0" y="0"/>
+          <a:chExt cx="0" cy="0"/>
+        </a:xfrm>
+      </p:grpSpPr>
+      <p:sp>
+        <p:nvSpPr>
+          <p:cNvPr id="3" name="מציין מיקום טקסט 2">
+            <a:extLst>
+              <a:ext uri="{FF2B5EF4-FFF2-40B4-BE49-F238E27FC236}">
                 <a16:creationId xmlns:a16="http://schemas.microsoft.com/office/drawing/2014/main" id="{4CB86365-92C8-4E7D-A158-6B4831384C3F}"/>
               </a:ext>
             </a:extLst>
@@ -15604,9 +15890,22 @@
         </p:spPr>
         <p:txBody>
           <a:bodyPr>
-            <a:normAutofit/>
+            <a:normAutofit fontScale="92500" lnSpcReduction="20000"/>
           </a:bodyPr>
           <a:lstStyle/>
+          <a:p>
+            <a:pPr marL="285750" indent="-285750" algn="r">
+              <a:buFont typeface="Wingdings" panose="05000000000000000000" pitchFamily="2" charset="2"/>
+              <a:buChar char="Ø"/>
+            </a:pPr>
+            <a:r>
+              <a:rPr lang="he-IL" sz="2000" dirty="0">
+                <a:latin typeface="Calibri" panose="020F0502020204030204" pitchFamily="34" charset="0"/>
+                <a:cs typeface="Calibri" panose="020F0502020204030204" pitchFamily="34" charset="0"/>
+              </a:rPr>
+              <a:t>שיפור פיתוח השיטה של למידת מכונה</a:t>
+            </a:r>
+          </a:p>
           <a:p>
             <a:pPr marL="285750" indent="-285750" algn="r">
               <a:buFont typeface="Wingdings" panose="05000000000000000000" pitchFamily="2" charset="2"/>
@@ -15643,6 +15942,19 @@
                 <a:latin typeface="Calibri" panose="020F0502020204030204" pitchFamily="34" charset="0"/>
                 <a:cs typeface="Calibri" panose="020F0502020204030204" pitchFamily="34" charset="0"/>
               </a:rPr>
+              <a:t>הצלבת השיטות לכדי כלי אחד ויישום עקרון הכרעת הרוב</a:t>
+            </a:r>
+          </a:p>
+          <a:p>
+            <a:pPr marL="285750" indent="-285750" algn="r">
+              <a:buFont typeface="Wingdings" panose="05000000000000000000" pitchFamily="2" charset="2"/>
+              <a:buChar char="Ø"/>
+            </a:pPr>
+            <a:r>
+              <a:rPr lang="he-IL" sz="2000" dirty="0">
+                <a:latin typeface="Calibri" panose="020F0502020204030204" pitchFamily="34" charset="0"/>
+                <a:cs typeface="Calibri" panose="020F0502020204030204" pitchFamily="34" charset="0"/>
+              </a:rPr>
               <a:t>פיתוח ממשק </a:t>
             </a:r>
             <a:r>
@@ -15670,34 +15982,7 @@
                 <a:latin typeface="Calibri" panose="020F0502020204030204" pitchFamily="34" charset="0"/>
                 <a:cs typeface="Calibri" panose="020F0502020204030204" pitchFamily="34" charset="0"/>
               </a:rPr>
-              <a:t>הצלבת הכילים, הממשק לתוכנית</a:t>
-            </a:r>
-          </a:p>
-          <a:p>
-            <a:pPr marL="285750" indent="-285750" algn="r">
-              <a:buFont typeface="Wingdings" panose="05000000000000000000" pitchFamily="2" charset="2"/>
-              <a:buChar char="Ø"/>
-            </a:pPr>
-            <a:r>
-              <a:rPr lang="he-IL" sz="2000" dirty="0">
-                <a:latin typeface="Calibri" panose="020F0502020204030204" pitchFamily="34" charset="0"/>
-                <a:cs typeface="Calibri" panose="020F0502020204030204" pitchFamily="34" charset="0"/>
-              </a:rPr>
-              <a:t>הרצה על </a:t>
-            </a:r>
-            <a:r>
-              <a:rPr lang="en-US" sz="2000" dirty="0">
-                <a:latin typeface="Calibri" panose="020F0502020204030204" pitchFamily="34" charset="0"/>
-                <a:cs typeface="Calibri" panose="020F0502020204030204" pitchFamily="34" charset="0"/>
-              </a:rPr>
-              <a:t>DATABASE</a:t>
-            </a:r>
-            <a:r>
-              <a:rPr lang="he-IL" sz="2000" dirty="0">
-                <a:latin typeface="Calibri" panose="020F0502020204030204" pitchFamily="34" charset="0"/>
-                <a:cs typeface="Calibri" panose="020F0502020204030204" pitchFamily="34" charset="0"/>
-              </a:rPr>
-              <a:t> שונים </a:t>
+              <a:t>ביצוע הרצות וניתוחים על מאגרי נתונים קיימים</a:t>
             </a:r>
           </a:p>
         </p:txBody>

</xml_diff>